<commit_message>
Done of PHP project
</commit_message>
<xml_diff>
--- a/RED.pptx
+++ b/RED.pptx
@@ -259,7 +259,7 @@
           <a:p>
             <a:fld id="{320318F5-16E2-4F7B-A9F9-C722530DDCD5}" type="datetimeFigureOut">
               <a:rPr lang="en-US" smtClean="0"/>
-              <a:t>8/16/2021</a:t>
+              <a:t>8/22/2021</a:t>
             </a:fld>
             <a:endParaRPr lang="en-US"/>
           </a:p>
@@ -457,7 +457,7 @@
           <a:p>
             <a:fld id="{320318F5-16E2-4F7B-A9F9-C722530DDCD5}" type="datetimeFigureOut">
               <a:rPr lang="en-US" smtClean="0"/>
-              <a:t>8/16/2021</a:t>
+              <a:t>8/22/2021</a:t>
             </a:fld>
             <a:endParaRPr lang="en-US"/>
           </a:p>
@@ -665,7 +665,7 @@
           <a:p>
             <a:fld id="{320318F5-16E2-4F7B-A9F9-C722530DDCD5}" type="datetimeFigureOut">
               <a:rPr lang="en-US" smtClean="0"/>
-              <a:t>8/16/2021</a:t>
+              <a:t>8/22/2021</a:t>
             </a:fld>
             <a:endParaRPr lang="en-US"/>
           </a:p>
@@ -863,7 +863,7 @@
           <a:p>
             <a:fld id="{320318F5-16E2-4F7B-A9F9-C722530DDCD5}" type="datetimeFigureOut">
               <a:rPr lang="en-US" smtClean="0"/>
-              <a:t>8/16/2021</a:t>
+              <a:t>8/22/2021</a:t>
             </a:fld>
             <a:endParaRPr lang="en-US"/>
           </a:p>
@@ -1138,7 +1138,7 @@
           <a:p>
             <a:fld id="{320318F5-16E2-4F7B-A9F9-C722530DDCD5}" type="datetimeFigureOut">
               <a:rPr lang="en-US" smtClean="0"/>
-              <a:t>8/16/2021</a:t>
+              <a:t>8/22/2021</a:t>
             </a:fld>
             <a:endParaRPr lang="en-US"/>
           </a:p>
@@ -1403,7 +1403,7 @@
           <a:p>
             <a:fld id="{320318F5-16E2-4F7B-A9F9-C722530DDCD5}" type="datetimeFigureOut">
               <a:rPr lang="en-US" smtClean="0"/>
-              <a:t>8/16/2021</a:t>
+              <a:t>8/22/2021</a:t>
             </a:fld>
             <a:endParaRPr lang="en-US"/>
           </a:p>
@@ -1815,7 +1815,7 @@
           <a:p>
             <a:fld id="{320318F5-16E2-4F7B-A9F9-C722530DDCD5}" type="datetimeFigureOut">
               <a:rPr lang="en-US" smtClean="0"/>
-              <a:t>8/16/2021</a:t>
+              <a:t>8/22/2021</a:t>
             </a:fld>
             <a:endParaRPr lang="en-US"/>
           </a:p>
@@ -1956,7 +1956,7 @@
           <a:p>
             <a:fld id="{320318F5-16E2-4F7B-A9F9-C722530DDCD5}" type="datetimeFigureOut">
               <a:rPr lang="en-US" smtClean="0"/>
-              <a:t>8/16/2021</a:t>
+              <a:t>8/22/2021</a:t>
             </a:fld>
             <a:endParaRPr lang="en-US"/>
           </a:p>
@@ -2069,7 +2069,7 @@
           <a:p>
             <a:fld id="{320318F5-16E2-4F7B-A9F9-C722530DDCD5}" type="datetimeFigureOut">
               <a:rPr lang="en-US" smtClean="0"/>
-              <a:t>8/16/2021</a:t>
+              <a:t>8/22/2021</a:t>
             </a:fld>
             <a:endParaRPr lang="en-US"/>
           </a:p>
@@ -2380,7 +2380,7 @@
           <a:p>
             <a:fld id="{320318F5-16E2-4F7B-A9F9-C722530DDCD5}" type="datetimeFigureOut">
               <a:rPr lang="en-US" smtClean="0"/>
-              <a:t>8/16/2021</a:t>
+              <a:t>8/22/2021</a:t>
             </a:fld>
             <a:endParaRPr lang="en-US"/>
           </a:p>
@@ -2668,7 +2668,7 @@
           <a:p>
             <a:fld id="{320318F5-16E2-4F7B-A9F9-C722530DDCD5}" type="datetimeFigureOut">
               <a:rPr lang="en-US" smtClean="0"/>
-              <a:t>8/16/2021</a:t>
+              <a:t>8/22/2021</a:t>
             </a:fld>
             <a:endParaRPr lang="en-US"/>
           </a:p>
@@ -2909,7 +2909,7 @@
           <a:p>
             <a:fld id="{320318F5-16E2-4F7B-A9F9-C722530DDCD5}" type="datetimeFigureOut">
               <a:rPr lang="en-US" smtClean="0"/>
-              <a:t>8/16/2021</a:t>
+              <a:t>8/22/2021</a:t>
             </a:fld>
             <a:endParaRPr lang="en-US"/>
           </a:p>
@@ -3341,7 +3341,7 @@
           <p:nvPr>
             <p:extLst>
               <p:ext uri="{D42A27DB-BD31-4B8C-83A1-F6EECF244321}">
-                <p14:modId xmlns:p14="http://schemas.microsoft.com/office/powerpoint/2010/main" val="3720943515"/>
+                <p14:modId xmlns:p14="http://schemas.microsoft.com/office/powerpoint/2010/main" val="4009390592"/>
               </p:ext>
             </p:extLst>
           </p:nvPr>
@@ -3481,7 +3481,10 @@
                       <a:endParaRPr lang="en-US" sz="1600" dirty="0"/>
                     </a:p>
                     <a:p>
-                      <a:endParaRPr lang="en-US" sz="1600" dirty="0"/>
+                      <a:r>
+                        <a:rPr lang="en-US" sz="1600" dirty="0"/>
+                        <a:t>productid</a:t>
+                      </a:r>
                     </a:p>
                   </a:txBody>
                   <a:tcPr/>
@@ -3890,396 +3893,6 @@
           </a:graphicData>
         </a:graphic>
       </p:graphicFrame>
-      <p:graphicFrame>
-        <p:nvGraphicFramePr>
-          <p:cNvPr id="11" name="Table 4">
-            <a:extLst>
-              <a:ext uri="{FF2B5EF4-FFF2-40B4-BE49-F238E27FC236}">
-                <a16:creationId xmlns:a16="http://schemas.microsoft.com/office/drawing/2014/main" id="{256F07E8-38A5-4D70-BBE4-7867A41EA6FB}"/>
-              </a:ext>
-            </a:extLst>
-          </p:cNvPr>
-          <p:cNvGraphicFramePr>
-            <a:graphicFrameLocks noGrp="1"/>
-          </p:cNvGraphicFramePr>
-          <p:nvPr>
-            <p:extLst>
-              <p:ext uri="{D42A27DB-BD31-4B8C-83A1-F6EECF244321}">
-                <p14:modId xmlns:p14="http://schemas.microsoft.com/office/powerpoint/2010/main" val="147898191"/>
-              </p:ext>
-            </p:extLst>
-          </p:nvPr>
-        </p:nvGraphicFramePr>
-        <p:xfrm>
-          <a:off x="4721446" y="1204555"/>
-          <a:ext cx="2340322" cy="1432560"/>
-        </p:xfrm>
-        <a:graphic>
-          <a:graphicData uri="http://schemas.openxmlformats.org/drawingml/2006/table">
-            <a:tbl>
-              <a:tblPr firstRow="1" bandRow="1">
-                <a:tableStyleId>{5C22544A-7EE6-4342-B048-85BDC9FD1C3A}</a:tableStyleId>
-              </a:tblPr>
-              <a:tblGrid>
-                <a:gridCol w="463673">
-                  <a:extLst>
-                    <a:ext uri="{9D8B030D-6E8A-4147-A177-3AD203B41FA5}">
-                      <a16:colId xmlns:a16="http://schemas.microsoft.com/office/drawing/2014/main" val="2386244547"/>
-                    </a:ext>
-                  </a:extLst>
-                </a:gridCol>
-                <a:gridCol w="1279233">
-                  <a:extLst>
-                    <a:ext uri="{9D8B030D-6E8A-4147-A177-3AD203B41FA5}">
-                      <a16:colId xmlns:a16="http://schemas.microsoft.com/office/drawing/2014/main" val="1537778533"/>
-                    </a:ext>
-                  </a:extLst>
-                </a:gridCol>
-                <a:gridCol w="597416">
-                  <a:extLst>
-                    <a:ext uri="{9D8B030D-6E8A-4147-A177-3AD203B41FA5}">
-                      <a16:colId xmlns:a16="http://schemas.microsoft.com/office/drawing/2014/main" val="602788907"/>
-                    </a:ext>
-                  </a:extLst>
-                </a:gridCol>
-              </a:tblGrid>
-              <a:tr h="333765">
-                <a:tc gridSpan="3">
-                  <a:txBody>
-                    <a:bodyPr/>
-                    <a:lstStyle/>
-                    <a:p>
-                      <a:pPr algn="ctr"/>
-                      <a:r>
-                        <a:rPr lang="en-US" dirty="0" err="1"/>
-                        <a:t>OrderDetails</a:t>
-                      </a:r>
-                      <a:endParaRPr lang="en-US" dirty="0"/>
-                    </a:p>
-                  </a:txBody>
-                  <a:tcPr/>
-                </a:tc>
-                <a:tc hMerge="1">
-                  <a:txBody>
-                    <a:bodyPr/>
-                    <a:lstStyle/>
-                    <a:p>
-                      <a:endParaRPr lang="en-US" dirty="0"/>
-                    </a:p>
-                  </a:txBody>
-                  <a:tcPr/>
-                </a:tc>
-                <a:tc hMerge="1">
-                  <a:txBody>
-                    <a:bodyPr/>
-                    <a:lstStyle/>
-                    <a:p>
-                      <a:endParaRPr lang="en-US" dirty="0"/>
-                    </a:p>
-                  </a:txBody>
-                  <a:tcPr/>
-                </a:tc>
-                <a:extLst>
-                  <a:ext uri="{0D108BD9-81ED-4DB2-BD59-A6C34878D82A}">
-                    <a16:rowId xmlns:a16="http://schemas.microsoft.com/office/drawing/2014/main" val="3249401521"/>
-                  </a:ext>
-                </a:extLst>
-              </a:tr>
-              <a:tr h="933159">
-                <a:tc>
-                  <a:txBody>
-                    <a:bodyPr/>
-                    <a:lstStyle/>
-                    <a:p>
-                      <a:r>
-                        <a:rPr lang="en-US" dirty="0">
-                          <a:solidFill>
-                            <a:schemeClr val="accent2"/>
-                          </a:solidFill>
-                        </a:rPr>
-                        <a:t>PK</a:t>
-                      </a:r>
-                    </a:p>
-                    <a:p>
-                      <a:r>
-                        <a:rPr lang="en-US" dirty="0">
-                          <a:solidFill>
-                            <a:schemeClr val="accent2"/>
-                          </a:solidFill>
-                        </a:rPr>
-                        <a:t>FK</a:t>
-                      </a:r>
-                    </a:p>
-                    <a:p>
-                      <a:r>
-                        <a:rPr lang="en-US" dirty="0">
-                          <a:solidFill>
-                            <a:schemeClr val="accent2"/>
-                          </a:solidFill>
-                        </a:rPr>
-                        <a:t>FK</a:t>
-                      </a:r>
-                    </a:p>
-                  </a:txBody>
-                  <a:tcPr/>
-                </a:tc>
-                <a:tc>
-                  <a:txBody>
-                    <a:bodyPr/>
-                    <a:lstStyle/>
-                    <a:p>
-                      <a:r>
-                        <a:rPr lang="en-US" sz="1600" dirty="0" err="1"/>
-                        <a:t>Orderdetailid</a:t>
-                      </a:r>
-                      <a:endParaRPr lang="en-US" sz="1600" dirty="0"/>
-                    </a:p>
-                    <a:p>
-                      <a:r>
-                        <a:rPr lang="en-US" sz="1600" dirty="0" err="1"/>
-                        <a:t>Orderid</a:t>
-                      </a:r>
-                      <a:endParaRPr lang="en-US" sz="1600" dirty="0"/>
-                    </a:p>
-                    <a:p>
-                      <a:r>
-                        <a:rPr lang="en-US" sz="1600" dirty="0"/>
-                        <a:t>Productid</a:t>
-                      </a:r>
-                    </a:p>
-                    <a:p>
-                      <a:r>
-                        <a:rPr lang="en-US" sz="1600" dirty="0"/>
-                        <a:t>quantity</a:t>
-                      </a:r>
-                    </a:p>
-                  </a:txBody>
-                  <a:tcPr/>
-                </a:tc>
-                <a:tc>
-                  <a:txBody>
-                    <a:bodyPr/>
-                    <a:lstStyle/>
-                    <a:p>
-                      <a:r>
-                        <a:rPr lang="en-US" sz="1600" dirty="0"/>
-                        <a:t>Int</a:t>
-                      </a:r>
-                    </a:p>
-                    <a:p>
-                      <a:r>
-                        <a:rPr lang="en-US" sz="1600" dirty="0"/>
-                        <a:t>Int</a:t>
-                      </a:r>
-                    </a:p>
-                    <a:p>
-                      <a:r>
-                        <a:rPr lang="en-US" sz="1600" dirty="0"/>
-                        <a:t>Int</a:t>
-                      </a:r>
-                    </a:p>
-                    <a:p>
-                      <a:r>
-                        <a:rPr lang="en-US" sz="1600" dirty="0"/>
-                        <a:t>int</a:t>
-                      </a:r>
-                    </a:p>
-                  </a:txBody>
-                  <a:tcPr/>
-                </a:tc>
-                <a:extLst>
-                  <a:ext uri="{0D108BD9-81ED-4DB2-BD59-A6C34878D82A}">
-                    <a16:rowId xmlns:a16="http://schemas.microsoft.com/office/drawing/2014/main" val="3898919134"/>
-                  </a:ext>
-                </a:extLst>
-              </a:tr>
-            </a:tbl>
-          </a:graphicData>
-        </a:graphic>
-      </p:graphicFrame>
-      <p:graphicFrame>
-        <p:nvGraphicFramePr>
-          <p:cNvPr id="12" name="Table 4">
-            <a:extLst>
-              <a:ext uri="{FF2B5EF4-FFF2-40B4-BE49-F238E27FC236}">
-                <a16:creationId xmlns:a16="http://schemas.microsoft.com/office/drawing/2014/main" id="{948C359C-D31C-453B-80FD-6B055C050477}"/>
-              </a:ext>
-            </a:extLst>
-          </p:cNvPr>
-          <p:cNvGraphicFramePr>
-            <a:graphicFrameLocks noGrp="1"/>
-          </p:cNvGraphicFramePr>
-          <p:nvPr>
-            <p:extLst>
-              <p:ext uri="{D42A27DB-BD31-4B8C-83A1-F6EECF244321}">
-                <p14:modId xmlns:p14="http://schemas.microsoft.com/office/powerpoint/2010/main" val="3018011724"/>
-              </p:ext>
-            </p:extLst>
-          </p:nvPr>
-        </p:nvGraphicFramePr>
-        <p:xfrm>
-          <a:off x="4767718" y="4220886"/>
-          <a:ext cx="3081915" cy="1343564"/>
-        </p:xfrm>
-        <a:graphic>
-          <a:graphicData uri="http://schemas.openxmlformats.org/drawingml/2006/table">
-            <a:tbl>
-              <a:tblPr firstRow="1" bandRow="1">
-                <a:tableStyleId>{5C22544A-7EE6-4342-B048-85BDC9FD1C3A}</a:tableStyleId>
-              </a:tblPr>
-              <a:tblGrid>
-                <a:gridCol w="593286">
-                  <a:extLst>
-                    <a:ext uri="{9D8B030D-6E8A-4147-A177-3AD203B41FA5}">
-                      <a16:colId xmlns:a16="http://schemas.microsoft.com/office/drawing/2014/main" val="2386244547"/>
-                    </a:ext>
-                  </a:extLst>
-                </a:gridCol>
-                <a:gridCol w="1461324">
-                  <a:extLst>
-                    <a:ext uri="{9D8B030D-6E8A-4147-A177-3AD203B41FA5}">
-                      <a16:colId xmlns:a16="http://schemas.microsoft.com/office/drawing/2014/main" val="1537778533"/>
-                    </a:ext>
-                  </a:extLst>
-                </a:gridCol>
-                <a:gridCol w="1027305">
-                  <a:extLst>
-                    <a:ext uri="{9D8B030D-6E8A-4147-A177-3AD203B41FA5}">
-                      <a16:colId xmlns:a16="http://schemas.microsoft.com/office/drawing/2014/main" val="602788907"/>
-                    </a:ext>
-                  </a:extLst>
-                </a:gridCol>
-              </a:tblGrid>
-              <a:tr h="429164">
-                <a:tc gridSpan="3">
-                  <a:txBody>
-                    <a:bodyPr/>
-                    <a:lstStyle/>
-                    <a:p>
-                      <a:pPr algn="ctr"/>
-                      <a:r>
-                        <a:rPr lang="en-US" dirty="0"/>
-                        <a:t>Stocks</a:t>
-                      </a:r>
-                    </a:p>
-                  </a:txBody>
-                  <a:tcPr/>
-                </a:tc>
-                <a:tc hMerge="1">
-                  <a:txBody>
-                    <a:bodyPr/>
-                    <a:lstStyle/>
-                    <a:p>
-                      <a:endParaRPr lang="en-US" dirty="0"/>
-                    </a:p>
-                  </a:txBody>
-                  <a:tcPr/>
-                </a:tc>
-                <a:tc hMerge="1">
-                  <a:txBody>
-                    <a:bodyPr/>
-                    <a:lstStyle/>
-                    <a:p>
-                      <a:endParaRPr lang="en-US" dirty="0"/>
-                    </a:p>
-                  </a:txBody>
-                  <a:tcPr/>
-                </a:tc>
-                <a:extLst>
-                  <a:ext uri="{0D108BD9-81ED-4DB2-BD59-A6C34878D82A}">
-                    <a16:rowId xmlns:a16="http://schemas.microsoft.com/office/drawing/2014/main" val="3249401521"/>
-                  </a:ext>
-                </a:extLst>
-              </a:tr>
-              <a:tr h="429164">
-                <a:tc>
-                  <a:txBody>
-                    <a:bodyPr/>
-                    <a:lstStyle/>
-                    <a:p>
-                      <a:r>
-                        <a:rPr lang="en-US" dirty="0">
-                          <a:solidFill>
-                            <a:schemeClr val="accent2"/>
-                          </a:solidFill>
-                        </a:rPr>
-                        <a:t>PK</a:t>
-                      </a:r>
-                    </a:p>
-                    <a:p>
-                      <a:r>
-                        <a:rPr lang="en-US" dirty="0">
-                          <a:solidFill>
-                            <a:schemeClr val="accent2"/>
-                          </a:solidFill>
-                        </a:rPr>
-                        <a:t>FK</a:t>
-                      </a:r>
-                    </a:p>
-                  </a:txBody>
-                  <a:tcPr/>
-                </a:tc>
-                <a:tc>
-                  <a:txBody>
-                    <a:bodyPr/>
-                    <a:lstStyle/>
-                    <a:p>
-                      <a:r>
-                        <a:rPr lang="en-US" dirty="0" err="1"/>
-                        <a:t>Stockid</a:t>
-                      </a:r>
-                      <a:endParaRPr lang="en-US" dirty="0"/>
-                    </a:p>
-                    <a:p>
-                      <a:r>
-                        <a:rPr lang="en-US" dirty="0"/>
-                        <a:t>Productid</a:t>
-                      </a:r>
-                    </a:p>
-                    <a:p>
-                      <a:r>
-                        <a:rPr lang="en-US" dirty="0"/>
-                        <a:t>quantity</a:t>
-                      </a:r>
-                    </a:p>
-                  </a:txBody>
-                  <a:tcPr/>
-                </a:tc>
-                <a:tc>
-                  <a:txBody>
-                    <a:bodyPr/>
-                    <a:lstStyle/>
-                    <a:p>
-                      <a:r>
-                        <a:rPr lang="en-US" dirty="0"/>
-                        <a:t>Int</a:t>
-                      </a:r>
-                    </a:p>
-                    <a:p>
-                      <a:r>
-                        <a:rPr lang="en-US" dirty="0"/>
-                        <a:t>Int</a:t>
-                      </a:r>
-                    </a:p>
-                    <a:p>
-                      <a:r>
-                        <a:rPr lang="en-US" dirty="0"/>
-                        <a:t>Int</a:t>
-                      </a:r>
-                    </a:p>
-                  </a:txBody>
-                  <a:tcPr/>
-                </a:tc>
-                <a:extLst>
-                  <a:ext uri="{0D108BD9-81ED-4DB2-BD59-A6C34878D82A}">
-                    <a16:rowId xmlns:a16="http://schemas.microsoft.com/office/drawing/2014/main" val="3898919134"/>
-                  </a:ext>
-                </a:extLst>
-              </a:tr>
-            </a:tbl>
-          </a:graphicData>
-        </a:graphic>
-      </p:graphicFrame>
       <p:cxnSp>
         <p:nvCxnSpPr>
           <p:cNvPr id="60" name="Straight Connector 59">
@@ -4320,10 +3933,10 @@
       </p:cxnSp>
       <p:cxnSp>
         <p:nvCxnSpPr>
-          <p:cNvPr id="62" name="Straight Connector 61">
-            <a:extLst>
-              <a:ext uri="{FF2B5EF4-FFF2-40B4-BE49-F238E27FC236}">
-                <a16:creationId xmlns:a16="http://schemas.microsoft.com/office/drawing/2014/main" id="{670D6141-5CE0-4621-95ED-DBCFEEE475F2}"/>
+          <p:cNvPr id="80" name="Straight Connector 79">
+            <a:extLst>
+              <a:ext uri="{FF2B5EF4-FFF2-40B4-BE49-F238E27FC236}">
+                <a16:creationId xmlns:a16="http://schemas.microsoft.com/office/drawing/2014/main" id="{0316AA37-2A88-4FF4-A0BC-31E46877F097}"/>
               </a:ext>
             </a:extLst>
           </p:cNvPr>
@@ -4334,84 +3947,8 @@
         </p:nvCxnSpPr>
         <p:spPr>
           <a:xfrm flipH="1">
-            <a:off x="6530718" y="2371357"/>
-            <a:ext cx="2589187" cy="1815857"/>
-          </a:xfrm>
-          <a:prstGeom prst="line">
-            <a:avLst/>
-          </a:prstGeom>
-        </p:spPr>
-        <p:style>
-          <a:lnRef idx="1">
-            <a:schemeClr val="accent1"/>
-          </a:lnRef>
-          <a:fillRef idx="0">
-            <a:schemeClr val="accent1"/>
-          </a:fillRef>
-          <a:effectRef idx="0">
-            <a:schemeClr val="accent1"/>
-          </a:effectRef>
-          <a:fontRef idx="minor">
-            <a:schemeClr val="tx1"/>
-          </a:fontRef>
-        </p:style>
-      </p:cxnSp>
-      <p:cxnSp>
-        <p:nvCxnSpPr>
-          <p:cNvPr id="80" name="Straight Connector 79">
-            <a:extLst>
-              <a:ext uri="{FF2B5EF4-FFF2-40B4-BE49-F238E27FC236}">
-                <a16:creationId xmlns:a16="http://schemas.microsoft.com/office/drawing/2014/main" id="{0316AA37-2A88-4FF4-A0BC-31E46877F097}"/>
-              </a:ext>
-            </a:extLst>
-          </p:cNvPr>
-          <p:cNvCxnSpPr>
-            <a:cxnSpLocks/>
-          </p:cNvCxnSpPr>
-          <p:nvPr/>
-        </p:nvCxnSpPr>
-        <p:spPr>
-          <a:xfrm flipH="1">
-            <a:off x="3409557" y="1861115"/>
-            <a:ext cx="1301218" cy="1"/>
-          </a:xfrm>
-          <a:prstGeom prst="line">
-            <a:avLst/>
-          </a:prstGeom>
-        </p:spPr>
-        <p:style>
-          <a:lnRef idx="1">
-            <a:schemeClr val="accent1"/>
-          </a:lnRef>
-          <a:fillRef idx="0">
-            <a:schemeClr val="accent1"/>
-          </a:fillRef>
-          <a:effectRef idx="0">
-            <a:schemeClr val="accent1"/>
-          </a:effectRef>
-          <a:fontRef idx="minor">
-            <a:schemeClr val="tx1"/>
-          </a:fontRef>
-        </p:style>
-      </p:cxnSp>
-      <p:cxnSp>
-        <p:nvCxnSpPr>
-          <p:cNvPr id="83" name="Straight Connector 82">
-            <a:extLst>
-              <a:ext uri="{FF2B5EF4-FFF2-40B4-BE49-F238E27FC236}">
-                <a16:creationId xmlns:a16="http://schemas.microsoft.com/office/drawing/2014/main" id="{2E5BFAC7-2E13-4AEC-BF92-25094B5C166F}"/>
-              </a:ext>
-            </a:extLst>
-          </p:cNvPr>
-          <p:cNvCxnSpPr>
-            <a:cxnSpLocks/>
-          </p:cNvCxnSpPr>
-          <p:nvPr/>
-        </p:nvCxnSpPr>
-        <p:spPr>
-          <a:xfrm flipH="1">
-            <a:off x="7003497" y="1623318"/>
-            <a:ext cx="1682894" cy="0"/>
+            <a:off x="3409557" y="1861116"/>
+            <a:ext cx="5276834" cy="0"/>
           </a:xfrm>
           <a:prstGeom prst="line">
             <a:avLst/>
@@ -4736,42 +4273,7 @@
         </p:nvSpPr>
         <p:spPr>
           <a:xfrm>
-            <a:off x="3417149" y="1393922"/>
-            <a:ext cx="492369" cy="369332"/>
-          </a:xfrm>
-          <a:prstGeom prst="rect">
-            <a:avLst/>
-          </a:prstGeom>
-          <a:noFill/>
-        </p:spPr>
-        <p:txBody>
-          <a:bodyPr wrap="square" rtlCol="0">
-            <a:spAutoFit/>
-          </a:bodyPr>
-          <a:lstStyle/>
-          <a:p>
-            <a:r>
-              <a:rPr lang="en-US" dirty="0"/>
-              <a:t>1</a:t>
-            </a:r>
-          </a:p>
-        </p:txBody>
-      </p:sp>
-      <p:sp>
-        <p:nvSpPr>
-          <p:cNvPr id="93" name="TextBox 92">
-            <a:extLst>
-              <a:ext uri="{FF2B5EF4-FFF2-40B4-BE49-F238E27FC236}">
-                <a16:creationId xmlns:a16="http://schemas.microsoft.com/office/drawing/2014/main" id="{64285398-8F61-498B-B39E-E45CCA62DFE8}"/>
-              </a:ext>
-            </a:extLst>
-          </p:cNvPr>
-          <p:cNvSpPr txBox="1"/>
-          <p:nvPr/>
-        </p:nvSpPr>
-        <p:spPr>
-          <a:xfrm>
-            <a:off x="8199372" y="1204555"/>
+            <a:off x="8194022" y="1460029"/>
             <a:ext cx="492369" cy="369332"/>
           </a:xfrm>
           <a:prstGeom prst="rect">
@@ -4829,41 +4331,6 @@
       </p:sp>
       <p:sp>
         <p:nvSpPr>
-          <p:cNvPr id="95" name="TextBox 94">
-            <a:extLst>
-              <a:ext uri="{FF2B5EF4-FFF2-40B4-BE49-F238E27FC236}">
-                <a16:creationId xmlns:a16="http://schemas.microsoft.com/office/drawing/2014/main" id="{A41C019E-C7F6-4FF9-B965-0EB21F0AB8B6}"/>
-              </a:ext>
-            </a:extLst>
-          </p:cNvPr>
-          <p:cNvSpPr txBox="1"/>
-          <p:nvPr/>
-        </p:nvSpPr>
-        <p:spPr>
-          <a:xfrm>
-            <a:off x="8989950" y="2524678"/>
-            <a:ext cx="492369" cy="369332"/>
-          </a:xfrm>
-          <a:prstGeom prst="rect">
-            <a:avLst/>
-          </a:prstGeom>
-          <a:noFill/>
-        </p:spPr>
-        <p:txBody>
-          <a:bodyPr wrap="square" rtlCol="0">
-            <a:spAutoFit/>
-          </a:bodyPr>
-          <a:lstStyle/>
-          <a:p>
-            <a:r>
-              <a:rPr lang="en-US" dirty="0"/>
-              <a:t>1</a:t>
-            </a:r>
-          </a:p>
-        </p:txBody>
-      </p:sp>
-      <p:sp>
-        <p:nvSpPr>
           <p:cNvPr id="96" name="TextBox 95">
             <a:extLst>
               <a:ext uri="{FF2B5EF4-FFF2-40B4-BE49-F238E27FC236}">
@@ -4911,77 +4378,7 @@
         </p:nvSpPr>
         <p:spPr>
           <a:xfrm>
-            <a:off x="4379467" y="1454112"/>
-            <a:ext cx="492369" cy="400110"/>
-          </a:xfrm>
-          <a:prstGeom prst="rect">
-            <a:avLst/>
-          </a:prstGeom>
-          <a:noFill/>
-        </p:spPr>
-        <p:txBody>
-          <a:bodyPr wrap="square" rtlCol="0">
-            <a:spAutoFit/>
-          </a:bodyPr>
-          <a:lstStyle/>
-          <a:p>
-            <a:r>
-              <a:rPr lang="en-US" sz="2000" dirty="0"/>
-              <a:t>*</a:t>
-            </a:r>
-          </a:p>
-        </p:txBody>
-      </p:sp>
-      <p:sp>
-        <p:nvSpPr>
-          <p:cNvPr id="98" name="TextBox 97">
-            <a:extLst>
-              <a:ext uri="{FF2B5EF4-FFF2-40B4-BE49-F238E27FC236}">
-                <a16:creationId xmlns:a16="http://schemas.microsoft.com/office/drawing/2014/main" id="{C912D8FE-ED71-4213-B8D2-3591128E01E9}"/>
-              </a:ext>
-            </a:extLst>
-          </p:cNvPr>
-          <p:cNvSpPr txBox="1"/>
-          <p:nvPr/>
-        </p:nvSpPr>
-        <p:spPr>
-          <a:xfrm>
-            <a:off x="7077004" y="1332633"/>
-            <a:ext cx="492369" cy="400110"/>
-          </a:xfrm>
-          <a:prstGeom prst="rect">
-            <a:avLst/>
-          </a:prstGeom>
-          <a:noFill/>
-        </p:spPr>
-        <p:txBody>
-          <a:bodyPr wrap="square" rtlCol="0">
-            <a:spAutoFit/>
-          </a:bodyPr>
-          <a:lstStyle/>
-          <a:p>
-            <a:r>
-              <a:rPr lang="en-US" sz="2000" dirty="0"/>
-              <a:t>*</a:t>
-            </a:r>
-          </a:p>
-        </p:txBody>
-      </p:sp>
-      <p:sp>
-        <p:nvSpPr>
-          <p:cNvPr id="99" name="TextBox 98">
-            <a:extLst>
-              <a:ext uri="{FF2B5EF4-FFF2-40B4-BE49-F238E27FC236}">
-                <a16:creationId xmlns:a16="http://schemas.microsoft.com/office/drawing/2014/main" id="{85A3D5B8-4C7F-41F8-BE10-F06682ECA07D}"/>
-              </a:ext>
-            </a:extLst>
-          </p:cNvPr>
-          <p:cNvSpPr txBox="1"/>
-          <p:nvPr/>
-        </p:nvSpPr>
-        <p:spPr>
-          <a:xfrm>
-            <a:off x="6168304" y="3862712"/>
+            <a:off x="3567056" y="1484924"/>
             <a:ext cx="492369" cy="400110"/>
           </a:xfrm>
           <a:prstGeom prst="rect">

</xml_diff>